<commit_message>
external circular dependency ppt  적용
</commit_message>
<xml_diff>
--- a/DsDotNet/src/UnitTest/UnitTest.Engine/ImportOffice/Sample/SubAssy.pptx
+++ b/DsDotNet/src/UnitTest/UnitTest.Engine/ImportOffice/Sample/SubAssy.pptx
@@ -3999,7 +3999,7 @@
           <a:effectLst/>
           <a:extLst>
             <a:ext uri="{91240B29-F687-4f45-9708-019B960494DF}">
-              <a14:hiddenLine xmlns="" xmlns:a14="http://schemas.microsoft.com/office/drawing/2010/main" w="9525">
+              <a14:hiddenLine xmlns:a14="http://schemas.microsoft.com/office/drawing/2010/main" xmlns="" w="9525">
                 <a:solidFill>
                   <a:srgbClr val="000000"/>
                 </a:solidFill>
@@ -4191,7 +4191,7 @@
           <a:p>
             <a:fld id="{3E1D827B-9946-4E0D-97BA-FFCB17A9AF00}" type="datetimeFigureOut">
               <a:rPr lang="ko-KR" altLang="en-US" smtClean="0"/>
-              <a:t>2022-12-20</a:t>
+              <a:t>2022-12-22</a:t>
             </a:fld>
             <a:endParaRPr lang="ko-KR" altLang="en-US"/>
           </a:p>
@@ -4509,7 +4509,7 @@
           <a:p>
             <a:fld id="{3E1D827B-9946-4E0D-97BA-FFCB17A9AF00}" type="datetimeFigureOut">
               <a:rPr lang="ko-KR" altLang="en-US" smtClean="0"/>
-              <a:t>2022-12-20</a:t>
+              <a:t>2022-12-22</a:t>
             </a:fld>
             <a:endParaRPr lang="ko-KR" altLang="en-US"/>
           </a:p>
@@ -4997,7 +4997,7 @@
           <a:p>
             <a:fld id="{3E1D827B-9946-4E0D-97BA-FFCB17A9AF00}" type="datetimeFigureOut">
               <a:rPr lang="ko-KR" altLang="en-US" smtClean="0"/>
-              <a:t>2022-12-20</a:t>
+              <a:t>2022-12-22</a:t>
             </a:fld>
             <a:endParaRPr lang="ko-KR" altLang="en-US"/>
           </a:p>
@@ -5366,7 +5366,7 @@
           <a:p>
             <a:fld id="{3E1D827B-9946-4E0D-97BA-FFCB17A9AF00}" type="datetimeFigureOut">
               <a:rPr lang="ko-KR" altLang="en-US" smtClean="0"/>
-              <a:t>2022-12-20</a:t>
+              <a:t>2022-12-22</a:t>
             </a:fld>
             <a:endParaRPr lang="ko-KR" altLang="en-US"/>
           </a:p>
@@ -5521,7 +5521,7 @@
           <a:ln/>
           <a:extLst>
             <a:ext uri="{91240B29-F687-4f45-9708-019B960494DF}">
-              <a14:hiddenLine xmlns="" xmlns:a14="http://schemas.microsoft.com/office/drawing/2010/main" w="9525">
+              <a14:hiddenLine xmlns:a14="http://schemas.microsoft.com/office/drawing/2010/main" xmlns="" w="9525">
                 <a:solidFill>
                   <a:srgbClr val="000000"/>
                 </a:solidFill>
@@ -5639,7 +5639,7 @@
           <a:p>
             <a:fld id="{3E1D827B-9946-4E0D-97BA-FFCB17A9AF00}" type="datetimeFigureOut">
               <a:rPr lang="ko-KR" altLang="en-US" smtClean="0"/>
-              <a:t>2022-12-20</a:t>
+              <a:t>2022-12-22</a:t>
             </a:fld>
             <a:endParaRPr lang="ko-KR" altLang="en-US"/>
           </a:p>
@@ -5796,7 +5796,7 @@
           <a:ln/>
           <a:extLst>
             <a:ext uri="{91240B29-F687-4f45-9708-019B960494DF}">
-              <a14:hiddenLine xmlns="" xmlns:a14="http://schemas.microsoft.com/office/drawing/2010/main" w="9525">
+              <a14:hiddenLine xmlns:a14="http://schemas.microsoft.com/office/drawing/2010/main" xmlns="" w="9525">
                 <a:solidFill>
                   <a:srgbClr val="000000"/>
                 </a:solidFill>
@@ -5924,7 +5924,7 @@
           <a:p>
             <a:fld id="{3E1D827B-9946-4E0D-97BA-FFCB17A9AF00}" type="datetimeFigureOut">
               <a:rPr lang="ko-KR" altLang="en-US" smtClean="0"/>
-              <a:t>2022-12-20</a:t>
+              <a:t>2022-12-22</a:t>
             </a:fld>
             <a:endParaRPr lang="ko-KR" altLang="en-US"/>
           </a:p>
@@ -6019,7 +6019,7 @@
           <a:p>
             <a:fld id="{3E1D827B-9946-4E0D-97BA-FFCB17A9AF00}" type="datetimeFigureOut">
               <a:rPr lang="ko-KR" altLang="en-US" smtClean="0"/>
-              <a:t>2022-12-20</a:t>
+              <a:t>2022-12-22</a:t>
             </a:fld>
             <a:endParaRPr lang="ko-KR" altLang="en-US"/>
           </a:p>
@@ -6244,7 +6244,7 @@
           <a:ln/>
           <a:extLst>
             <a:ext uri="{91240B29-F687-4f45-9708-019B960494DF}">
-              <a14:hiddenLine xmlns="" xmlns:a14="http://schemas.microsoft.com/office/drawing/2010/main" w="9525">
+              <a14:hiddenLine xmlns:a14="http://schemas.microsoft.com/office/drawing/2010/main" xmlns="" w="9525">
                 <a:solidFill>
                   <a:srgbClr val="000000"/>
                 </a:solidFill>
@@ -6372,7 +6372,7 @@
           <a:p>
             <a:fld id="{3E1D827B-9946-4E0D-97BA-FFCB17A9AF00}" type="datetimeFigureOut">
               <a:rPr lang="ko-KR" altLang="en-US" smtClean="0"/>
-              <a:t>2022-12-20</a:t>
+              <a:t>2022-12-22</a:t>
             </a:fld>
             <a:endParaRPr lang="ko-KR" altLang="en-US"/>
           </a:p>
@@ -6715,7 +6715,7 @@
           <a:p>
             <a:fld id="{3E1D827B-9946-4E0D-97BA-FFCB17A9AF00}" type="datetimeFigureOut">
               <a:rPr lang="ko-KR" altLang="en-US" smtClean="0"/>
-              <a:t>2022-12-20</a:t>
+              <a:t>2022-12-22</a:t>
             </a:fld>
             <a:endParaRPr lang="ko-KR" altLang="en-US"/>
           </a:p>
@@ -6870,7 +6870,7 @@
           <a:ln/>
           <a:extLst>
             <a:ext uri="{91240B29-F687-4f45-9708-019B960494DF}">
-              <a14:hiddenLine xmlns="" xmlns:a14="http://schemas.microsoft.com/office/drawing/2010/main" w="9525">
+              <a14:hiddenLine xmlns:a14="http://schemas.microsoft.com/office/drawing/2010/main" xmlns="" w="9525">
                 <a:solidFill>
                   <a:srgbClr val="000000"/>
                 </a:solidFill>
@@ -7054,7 +7054,7 @@
           <a:p>
             <a:fld id="{3E1D827B-9946-4E0D-97BA-FFCB17A9AF00}" type="datetimeFigureOut">
               <a:rPr lang="ko-KR" altLang="en-US" smtClean="0"/>
-              <a:t>2022-12-20</a:t>
+              <a:t>2022-12-22</a:t>
             </a:fld>
             <a:endParaRPr lang="ko-KR" altLang="en-US"/>
           </a:p>
@@ -7214,7 +7214,7 @@
           <a:ln/>
           <a:extLst>
             <a:ext uri="{91240B29-F687-4f45-9708-019B960494DF}">
-              <a14:hiddenLine xmlns="" xmlns:a14="http://schemas.microsoft.com/office/drawing/2010/main" w="9525">
+              <a14:hiddenLine xmlns:a14="http://schemas.microsoft.com/office/drawing/2010/main" xmlns="" w="9525">
                 <a:solidFill>
                   <a:srgbClr val="000000"/>
                 </a:solidFill>
@@ -7536,7 +7536,7 @@
           <a:p>
             <a:fld id="{3E1D827B-9946-4E0D-97BA-FFCB17A9AF00}" type="datetimeFigureOut">
               <a:rPr lang="ko-KR" altLang="en-US" smtClean="0"/>
-              <a:t>2022-12-20</a:t>
+              <a:t>2022-12-22</a:t>
             </a:fld>
             <a:endParaRPr lang="ko-KR" altLang="en-US"/>
           </a:p>
@@ -7696,7 +7696,7 @@
           <a:ln/>
           <a:extLst>
             <a:ext uri="{91240B29-F687-4f45-9708-019B960494DF}">
-              <a14:hiddenLine xmlns="" xmlns:a14="http://schemas.microsoft.com/office/drawing/2010/main" w="9525">
+              <a14:hiddenLine xmlns:a14="http://schemas.microsoft.com/office/drawing/2010/main" xmlns="" w="9525">
                 <a:solidFill>
                   <a:srgbClr val="000000"/>
                 </a:solidFill>
@@ -7762,7 +7762,7 @@
           <a:p>
             <a:fld id="{3E1D827B-9946-4E0D-97BA-FFCB17A9AF00}" type="datetimeFigureOut">
               <a:rPr lang="ko-KR" altLang="en-US" smtClean="0"/>
-              <a:t>2022-12-20</a:t>
+              <a:t>2022-12-22</a:t>
             </a:fld>
             <a:endParaRPr lang="ko-KR" altLang="en-US"/>
           </a:p>
@@ -7857,7 +7857,7 @@
           <a:p>
             <a:fld id="{3E1D827B-9946-4E0D-97BA-FFCB17A9AF00}" type="datetimeFigureOut">
               <a:rPr lang="ko-KR" altLang="en-US" smtClean="0"/>
-              <a:t>2022-12-20</a:t>
+              <a:t>2022-12-22</a:t>
             </a:fld>
             <a:endParaRPr lang="ko-KR" altLang="en-US"/>
           </a:p>
@@ -8125,7 +8125,7 @@
           <a:ln/>
           <a:extLst>
             <a:ext uri="{91240B29-F687-4f45-9708-019B960494DF}">
-              <a14:hiddenLine xmlns="" xmlns:a14="http://schemas.microsoft.com/office/drawing/2010/main" w="9525">
+              <a14:hiddenLine xmlns:a14="http://schemas.microsoft.com/office/drawing/2010/main" xmlns="" w="9525">
                 <a:solidFill>
                   <a:srgbClr val="000000"/>
                 </a:solidFill>
@@ -8324,7 +8324,7 @@
           <a:p>
             <a:fld id="{3E1D827B-9946-4E0D-97BA-FFCB17A9AF00}" type="datetimeFigureOut">
               <a:rPr lang="ko-KR" altLang="en-US" smtClean="0"/>
-              <a:t>2022-12-20</a:t>
+              <a:t>2022-12-22</a:t>
             </a:fld>
             <a:endParaRPr lang="ko-KR" altLang="en-US"/>
           </a:p>
@@ -8642,7 +8642,7 @@
           <a:p>
             <a:fld id="{3E1D827B-9946-4E0D-97BA-FFCB17A9AF00}" type="datetimeFigureOut">
               <a:rPr lang="ko-KR" altLang="en-US" smtClean="0"/>
-              <a:t>2022-12-20</a:t>
+              <a:t>2022-12-22</a:t>
             </a:fld>
             <a:endParaRPr lang="ko-KR" altLang="en-US"/>
           </a:p>
@@ -8912,7 +8912,7 @@
           <a:p>
             <a:fld id="{3E1D827B-9946-4E0D-97BA-FFCB17A9AF00}" type="datetimeFigureOut">
               <a:rPr lang="ko-KR" altLang="en-US" smtClean="0"/>
-              <a:t>2022-12-20</a:t>
+              <a:t>2022-12-22</a:t>
             </a:fld>
             <a:endParaRPr lang="ko-KR" altLang="en-US"/>
           </a:p>
@@ -11314,14 +11314,14 @@
           </p:cNvPr>
           <p:cNvCxnSpPr>
             <a:cxnSpLocks/>
-            <a:stCxn id="18" idx="2"/>
+            <a:stCxn id="18" idx="0"/>
             <a:endCxn id="18" idx="1"/>
           </p:cNvCxnSpPr>
           <p:nvPr/>
         </p:nvCxnSpPr>
         <p:spPr>
-          <a:xfrm rot="5400000" flipH="1">
-            <a:off x="2440172" y="3500381"/>
+          <a:xfrm rot="16200000" flipH="1" flipV="1">
+            <a:off x="2440172" y="3082132"/>
             <a:ext cx="418247" cy="637909"/>
           </a:xfrm>
           <a:prstGeom prst="bentConnector4">
@@ -11407,6 +11407,181 @@
           </a:p>
         </p:txBody>
       </p:sp>
+      <p:sp>
+        <p:nvSpPr>
+          <p:cNvPr id="13" name="사각형: 모서리가 접힌 도형 12">
+            <a:extLst>
+              <a:ext uri="{FF2B5EF4-FFF2-40B4-BE49-F238E27FC236}">
+                <a16:creationId xmlns:a16="http://schemas.microsoft.com/office/drawing/2014/main" id="{1778C219-8A4A-9F8B-8194-A226B2984DAB}"/>
+              </a:ext>
+            </a:extLst>
+          </p:cNvPr>
+          <p:cNvSpPr/>
+          <p:nvPr/>
+        </p:nvSpPr>
+        <p:spPr>
+          <a:xfrm>
+            <a:off x="9565436" y="5236979"/>
+            <a:ext cx="1657829" cy="611404"/>
+          </a:xfrm>
+          <a:prstGeom prst="foldedCorner">
+            <a:avLst>
+              <a:gd name="adj" fmla="val 0"/>
+            </a:avLst>
+          </a:prstGeom>
+        </p:spPr>
+        <p:style>
+          <a:lnRef idx="2">
+            <a:schemeClr val="accent1">
+              <a:shade val="50000"/>
+            </a:schemeClr>
+          </a:lnRef>
+          <a:fillRef idx="1">
+            <a:schemeClr val="accent1"/>
+          </a:fillRef>
+          <a:effectRef idx="0">
+            <a:schemeClr val="accent1"/>
+          </a:effectRef>
+          <a:fontRef idx="minor">
+            <a:schemeClr val="lt1"/>
+          </a:fontRef>
+        </p:style>
+        <p:txBody>
+          <a:bodyPr rtlCol="0" anchor="ctr"/>
+          <a:lstStyle/>
+          <a:p>
+            <a:pPr algn="ctr"/>
+            <a:r>
+              <a:rPr lang="en-US" altLang="ko-KR" sz="1200" dirty="0"/>
+              <a:t>Main</a:t>
+            </a:r>
+          </a:p>
+          <a:p>
+            <a:pPr algn="ctr"/>
+            <a:r>
+              <a:rPr lang="en-US" altLang="ko-KR" sz="1200" dirty="0"/>
+              <a:t>[sys1]</a:t>
+            </a:r>
+            <a:endParaRPr lang="ko-KR" altLang="en-US" sz="1200" dirty="0"/>
+          </a:p>
+        </p:txBody>
+      </p:sp>
+      <p:sp>
+        <p:nvSpPr>
+          <p:cNvPr id="15" name="타원 14">
+            <a:extLst>
+              <a:ext uri="{FF2B5EF4-FFF2-40B4-BE49-F238E27FC236}">
+                <a16:creationId xmlns:a16="http://schemas.microsoft.com/office/drawing/2014/main" id="{F373240F-556E-1608-9F3D-1C9EC4D014EB}"/>
+              </a:ext>
+            </a:extLst>
+          </p:cNvPr>
+          <p:cNvSpPr/>
+          <p:nvPr/>
+        </p:nvSpPr>
+        <p:spPr>
+          <a:xfrm>
+            <a:off x="1989446" y="4902321"/>
+            <a:ext cx="1543981" cy="656340"/>
+          </a:xfrm>
+          <a:prstGeom prst="ellipse">
+            <a:avLst/>
+          </a:prstGeom>
+          <a:noFill/>
+          <a:ln/>
+        </p:spPr>
+        <p:style>
+          <a:lnRef idx="2">
+            <a:schemeClr val="accent4"/>
+          </a:lnRef>
+          <a:fillRef idx="1">
+            <a:schemeClr val="lt1"/>
+          </a:fillRef>
+          <a:effectRef idx="0">
+            <a:schemeClr val="accent4"/>
+          </a:effectRef>
+          <a:fontRef idx="minor">
+            <a:schemeClr val="dk1"/>
+          </a:fontRef>
+        </p:style>
+        <p:txBody>
+          <a:bodyPr rtlCol="0" anchor="ctr"/>
+          <a:lstStyle/>
+          <a:p>
+            <a:pPr algn="ctr" defTabSz="914400" latinLnBrk="1"/>
+            <a:r>
+              <a:rPr lang="en-US" altLang="ko-KR" sz="1050" dirty="0">
+                <a:solidFill>
+                  <a:schemeClr val="tx1"/>
+                </a:solidFill>
+              </a:rPr>
+              <a:t>sys1$</a:t>
+            </a:r>
+          </a:p>
+          <a:p>
+            <a:pPr algn="ctr" defTabSz="914400" latinLnBrk="1"/>
+            <a:r>
+              <a:rPr lang="en-US" altLang="ko-KR" sz="1050" dirty="0">
+                <a:solidFill>
+                  <a:schemeClr val="tx1"/>
+                </a:solidFill>
+              </a:rPr>
+              <a:t>RBTCOMPL</a:t>
+            </a:r>
+            <a:endParaRPr lang="en-US" altLang="ko-KR" sz="900" b="1" dirty="0">
+              <a:solidFill>
+                <a:schemeClr val="tx1"/>
+              </a:solidFill>
+              <a:latin typeface="맑은 고딕" panose="020F0502020204030204"/>
+              <a:ea typeface="맑은 고딕" panose="020B0503020000020004" pitchFamily="50" charset="-127"/>
+            </a:endParaRPr>
+          </a:p>
+        </p:txBody>
+      </p:sp>
+      <p:cxnSp>
+        <p:nvCxnSpPr>
+          <p:cNvPr id="19" name="연결선: 꺾임 18">
+            <a:extLst>
+              <a:ext uri="{FF2B5EF4-FFF2-40B4-BE49-F238E27FC236}">
+                <a16:creationId xmlns:a16="http://schemas.microsoft.com/office/drawing/2014/main" id="{7E257E0E-38A9-7CCC-9FC7-75DECB74167D}"/>
+              </a:ext>
+            </a:extLst>
+          </p:cNvPr>
+          <p:cNvCxnSpPr>
+            <a:cxnSpLocks/>
+            <a:stCxn id="15" idx="0"/>
+            <a:endCxn id="18" idx="2"/>
+          </p:cNvCxnSpPr>
+          <p:nvPr/>
+        </p:nvCxnSpPr>
+        <p:spPr>
+          <a:xfrm rot="5400000" flipH="1" flipV="1">
+            <a:off x="2427912" y="4361984"/>
+            <a:ext cx="873863" cy="206813"/>
+          </a:xfrm>
+          <a:prstGeom prst="bentConnector3">
+            <a:avLst>
+              <a:gd name="adj1" fmla="val 50000"/>
+            </a:avLst>
+          </a:prstGeom>
+          <a:ln w="38100">
+            <a:tailEnd type="triangle"/>
+          </a:ln>
+        </p:spPr>
+        <p:style>
+          <a:lnRef idx="1">
+            <a:schemeClr val="accent1"/>
+          </a:lnRef>
+          <a:fillRef idx="0">
+            <a:schemeClr val="accent1"/>
+          </a:fillRef>
+          <a:effectRef idx="0">
+            <a:schemeClr val="accent1"/>
+          </a:effectRef>
+          <a:fontRef idx="minor">
+            <a:schemeClr val="tx1"/>
+          </a:fontRef>
+        </p:style>
+      </p:cxnSp>
     </p:spTree>
     <p:extLst>
       <p:ext uri="{BB962C8B-B14F-4D97-AF65-F5344CB8AC3E}">

</xml_diff>